<commit_message>
Add Anchorhead info to slideshow
</commit_message>
<xml_diff>
--- a/docs/CS680Presentation.pptx
+++ b/docs/CS680Presentation.pptx
@@ -229,7 +229,7 @@
             <a:fld id="{86BD080F-59E1-4889-82B2-94C34819E36D}" type="datetimeFigureOut">
               <a:rPr lang="en-US" smtClean="0"/>
               <a:pPr/>
-              <a:t>3/17/2012</a:t>
+              <a:t>3/17/12</a:t>
             </a:fld>
             <a:endParaRPr lang="en-US"/>
           </a:p>
@@ -391,13 +391,18 @@
             <a:fld id="{FD9330B2-2D8C-46C8-A0B5-2369B0D50E38}" type="slidenum">
               <a:rPr lang="en-US" smtClean="0"/>
               <a:pPr/>
-              <a:t>‹Nº›</a:t>
+              <a:t>‹#›</a:t>
             </a:fld>
             <a:endParaRPr lang="en-US"/>
           </a:p>
         </p:txBody>
       </p:sp>
     </p:spTree>
+    <p:extLst>
+      <p:ext uri="{BB962C8B-B14F-4D97-AF65-F5344CB8AC3E}">
+        <p14:creationId xmlns:p14="http://schemas.microsoft.com/office/powerpoint/2010/main" val="2609443646"/>
+      </p:ext>
+    </p:extLst>
   </p:cSld>
   <p:clrMap bg1="lt1" tx1="dk1" bg2="lt2" tx2="dk2" accent1="accent1" accent2="accent2" accent3="accent3" accent4="accent4" accent5="accent5" accent6="accent6" hlink="hlink" folHlink="folHlink"/>
   <p:notesStyle>
@@ -2094,7 +2099,7 @@
             <a:fld id="{8FCE8BCB-785D-411B-A74C-42F0947B65C9}" type="datetimeFigureOut">
               <a:rPr lang="en-US" smtClean="0"/>
               <a:pPr/>
-              <a:t>3/17/2012</a:t>
+              <a:t>3/17/12</a:t>
             </a:fld>
             <a:endParaRPr lang="en-US"/>
           </a:p>
@@ -2137,7 +2142,7 @@
             <a:fld id="{B399811B-96E0-4CFB-A18D-5C08E7CDD9A9}" type="slidenum">
               <a:rPr lang="en-US" smtClean="0"/>
               <a:pPr/>
-              <a:t>‹Nº›</a:t>
+              <a:t>‹#›</a:t>
             </a:fld>
             <a:endParaRPr lang="en-US"/>
           </a:p>
@@ -2146,7 +2151,7 @@
     </p:spTree>
     <p:extLst>
       <p:ext uri="{BB962C8B-B14F-4D97-AF65-F5344CB8AC3E}">
-        <p14:creationId xmlns="" xmlns:p14="http://schemas.microsoft.com/office/powerpoint/2010/main" val="1250395099"/>
+        <p14:creationId xmlns:p14="http://schemas.microsoft.com/office/powerpoint/2010/main" val="1250395099"/>
       </p:ext>
     </p:extLst>
   </p:cSld>
@@ -2266,7 +2271,7 @@
             <a:fld id="{8FCE8BCB-785D-411B-A74C-42F0947B65C9}" type="datetimeFigureOut">
               <a:rPr lang="en-US" smtClean="0"/>
               <a:pPr/>
-              <a:t>3/17/2012</a:t>
+              <a:t>3/17/12</a:t>
             </a:fld>
             <a:endParaRPr lang="en-US"/>
           </a:p>
@@ -2309,7 +2314,7 @@
             <a:fld id="{B399811B-96E0-4CFB-A18D-5C08E7CDD9A9}" type="slidenum">
               <a:rPr lang="en-US" smtClean="0"/>
               <a:pPr/>
-              <a:t>‹Nº›</a:t>
+              <a:t>‹#›</a:t>
             </a:fld>
             <a:endParaRPr lang="en-US"/>
           </a:p>
@@ -2318,7 +2323,7 @@
     </p:spTree>
     <p:extLst>
       <p:ext uri="{BB962C8B-B14F-4D97-AF65-F5344CB8AC3E}">
-        <p14:creationId xmlns="" xmlns:p14="http://schemas.microsoft.com/office/powerpoint/2010/main" val="3178426934"/>
+        <p14:creationId xmlns:p14="http://schemas.microsoft.com/office/powerpoint/2010/main" val="3178426934"/>
       </p:ext>
     </p:extLst>
   </p:cSld>
@@ -2448,7 +2453,7 @@
             <a:fld id="{8FCE8BCB-785D-411B-A74C-42F0947B65C9}" type="datetimeFigureOut">
               <a:rPr lang="en-US" smtClean="0"/>
               <a:pPr/>
-              <a:t>3/17/2012</a:t>
+              <a:t>3/17/12</a:t>
             </a:fld>
             <a:endParaRPr lang="en-US"/>
           </a:p>
@@ -2491,7 +2496,7 @@
             <a:fld id="{B399811B-96E0-4CFB-A18D-5C08E7CDD9A9}" type="slidenum">
               <a:rPr lang="en-US" smtClean="0"/>
               <a:pPr/>
-              <a:t>‹Nº›</a:t>
+              <a:t>‹#›</a:t>
             </a:fld>
             <a:endParaRPr lang="en-US"/>
           </a:p>
@@ -2500,7 +2505,7 @@
     </p:spTree>
     <p:extLst>
       <p:ext uri="{BB962C8B-B14F-4D97-AF65-F5344CB8AC3E}">
-        <p14:creationId xmlns="" xmlns:p14="http://schemas.microsoft.com/office/powerpoint/2010/main" val="17816594"/>
+        <p14:creationId xmlns:p14="http://schemas.microsoft.com/office/powerpoint/2010/main" val="17816594"/>
       </p:ext>
     </p:extLst>
   </p:cSld>
@@ -2620,7 +2625,7 @@
             <a:fld id="{8FCE8BCB-785D-411B-A74C-42F0947B65C9}" type="datetimeFigureOut">
               <a:rPr lang="en-US" smtClean="0"/>
               <a:pPr/>
-              <a:t>3/17/2012</a:t>
+              <a:t>3/17/12</a:t>
             </a:fld>
             <a:endParaRPr lang="en-US"/>
           </a:p>
@@ -2663,7 +2668,7 @@
             <a:fld id="{B399811B-96E0-4CFB-A18D-5C08E7CDD9A9}" type="slidenum">
               <a:rPr lang="en-US" smtClean="0"/>
               <a:pPr/>
-              <a:t>‹Nº›</a:t>
+              <a:t>‹#›</a:t>
             </a:fld>
             <a:endParaRPr lang="en-US"/>
           </a:p>
@@ -2672,7 +2677,7 @@
     </p:spTree>
     <p:extLst>
       <p:ext uri="{BB962C8B-B14F-4D97-AF65-F5344CB8AC3E}">
-        <p14:creationId xmlns="" xmlns:p14="http://schemas.microsoft.com/office/powerpoint/2010/main" val="2742419763"/>
+        <p14:creationId xmlns:p14="http://schemas.microsoft.com/office/powerpoint/2010/main" val="2742419763"/>
       </p:ext>
     </p:extLst>
   </p:cSld>
@@ -2868,7 +2873,7 @@
             <a:fld id="{8FCE8BCB-785D-411B-A74C-42F0947B65C9}" type="datetimeFigureOut">
               <a:rPr lang="en-US" smtClean="0"/>
               <a:pPr/>
-              <a:t>3/17/2012</a:t>
+              <a:t>3/17/12</a:t>
             </a:fld>
             <a:endParaRPr lang="en-US"/>
           </a:p>
@@ -2911,7 +2916,7 @@
             <a:fld id="{B399811B-96E0-4CFB-A18D-5C08E7CDD9A9}" type="slidenum">
               <a:rPr lang="en-US" smtClean="0"/>
               <a:pPr/>
-              <a:t>‹Nº›</a:t>
+              <a:t>‹#›</a:t>
             </a:fld>
             <a:endParaRPr lang="en-US"/>
           </a:p>
@@ -2920,7 +2925,7 @@
     </p:spTree>
     <p:extLst>
       <p:ext uri="{BB962C8B-B14F-4D97-AF65-F5344CB8AC3E}">
-        <p14:creationId xmlns="" xmlns:p14="http://schemas.microsoft.com/office/powerpoint/2010/main" val="2525513986"/>
+        <p14:creationId xmlns:p14="http://schemas.microsoft.com/office/powerpoint/2010/main" val="2525513986"/>
       </p:ext>
     </p:extLst>
   </p:cSld>
@@ -3158,7 +3163,7 @@
             <a:fld id="{8FCE8BCB-785D-411B-A74C-42F0947B65C9}" type="datetimeFigureOut">
               <a:rPr lang="en-US" smtClean="0"/>
               <a:pPr/>
-              <a:t>3/17/2012</a:t>
+              <a:t>3/17/12</a:t>
             </a:fld>
             <a:endParaRPr lang="en-US"/>
           </a:p>
@@ -3201,7 +3206,7 @@
             <a:fld id="{B399811B-96E0-4CFB-A18D-5C08E7CDD9A9}" type="slidenum">
               <a:rPr lang="en-US" smtClean="0"/>
               <a:pPr/>
-              <a:t>‹Nº›</a:t>
+              <a:t>‹#›</a:t>
             </a:fld>
             <a:endParaRPr lang="en-US"/>
           </a:p>
@@ -3210,7 +3215,7 @@
     </p:spTree>
     <p:extLst>
       <p:ext uri="{BB962C8B-B14F-4D97-AF65-F5344CB8AC3E}">
-        <p14:creationId xmlns="" xmlns:p14="http://schemas.microsoft.com/office/powerpoint/2010/main" val="2700884553"/>
+        <p14:creationId xmlns:p14="http://schemas.microsoft.com/office/powerpoint/2010/main" val="2700884553"/>
       </p:ext>
     </p:extLst>
   </p:cSld>
@@ -3582,7 +3587,7 @@
             <a:fld id="{8FCE8BCB-785D-411B-A74C-42F0947B65C9}" type="datetimeFigureOut">
               <a:rPr lang="en-US" smtClean="0"/>
               <a:pPr/>
-              <a:t>3/17/2012</a:t>
+              <a:t>3/17/12</a:t>
             </a:fld>
             <a:endParaRPr lang="en-US"/>
           </a:p>
@@ -3625,7 +3630,7 @@
             <a:fld id="{B399811B-96E0-4CFB-A18D-5C08E7CDD9A9}" type="slidenum">
               <a:rPr lang="en-US" smtClean="0"/>
               <a:pPr/>
-              <a:t>‹Nº›</a:t>
+              <a:t>‹#›</a:t>
             </a:fld>
             <a:endParaRPr lang="en-US"/>
           </a:p>
@@ -3634,7 +3639,7 @@
     </p:spTree>
     <p:extLst>
       <p:ext uri="{BB962C8B-B14F-4D97-AF65-F5344CB8AC3E}">
-        <p14:creationId xmlns="" xmlns:p14="http://schemas.microsoft.com/office/powerpoint/2010/main" val="2345642216"/>
+        <p14:creationId xmlns:p14="http://schemas.microsoft.com/office/powerpoint/2010/main" val="2345642216"/>
       </p:ext>
     </p:extLst>
   </p:cSld>
@@ -3702,7 +3707,7 @@
             <a:fld id="{8FCE8BCB-785D-411B-A74C-42F0947B65C9}" type="datetimeFigureOut">
               <a:rPr lang="en-US" smtClean="0"/>
               <a:pPr/>
-              <a:t>3/17/2012</a:t>
+              <a:t>3/17/12</a:t>
             </a:fld>
             <a:endParaRPr lang="en-US"/>
           </a:p>
@@ -3745,7 +3750,7 @@
             <a:fld id="{B399811B-96E0-4CFB-A18D-5C08E7CDD9A9}" type="slidenum">
               <a:rPr lang="en-US" smtClean="0"/>
               <a:pPr/>
-              <a:t>‹Nº›</a:t>
+              <a:t>‹#›</a:t>
             </a:fld>
             <a:endParaRPr lang="en-US"/>
           </a:p>
@@ -3754,7 +3759,7 @@
     </p:spTree>
     <p:extLst>
       <p:ext uri="{BB962C8B-B14F-4D97-AF65-F5344CB8AC3E}">
-        <p14:creationId xmlns="" xmlns:p14="http://schemas.microsoft.com/office/powerpoint/2010/main" val="1447817125"/>
+        <p14:creationId xmlns:p14="http://schemas.microsoft.com/office/powerpoint/2010/main" val="1447817125"/>
       </p:ext>
     </p:extLst>
   </p:cSld>
@@ -3799,7 +3804,7 @@
             <a:fld id="{8FCE8BCB-785D-411B-A74C-42F0947B65C9}" type="datetimeFigureOut">
               <a:rPr lang="en-US" smtClean="0"/>
               <a:pPr/>
-              <a:t>3/17/2012</a:t>
+              <a:t>3/17/12</a:t>
             </a:fld>
             <a:endParaRPr lang="en-US"/>
           </a:p>
@@ -3842,7 +3847,7 @@
             <a:fld id="{B399811B-96E0-4CFB-A18D-5C08E7CDD9A9}" type="slidenum">
               <a:rPr lang="en-US" smtClean="0"/>
               <a:pPr/>
-              <a:t>‹Nº›</a:t>
+              <a:t>‹#›</a:t>
             </a:fld>
             <a:endParaRPr lang="en-US"/>
           </a:p>
@@ -3851,7 +3856,7 @@
     </p:spTree>
     <p:extLst>
       <p:ext uri="{BB962C8B-B14F-4D97-AF65-F5344CB8AC3E}">
-        <p14:creationId xmlns="" xmlns:p14="http://schemas.microsoft.com/office/powerpoint/2010/main" val="1222013955"/>
+        <p14:creationId xmlns:p14="http://schemas.microsoft.com/office/powerpoint/2010/main" val="1222013955"/>
       </p:ext>
     </p:extLst>
   </p:cSld>
@@ -4078,7 +4083,7 @@
             <a:fld id="{8FCE8BCB-785D-411B-A74C-42F0947B65C9}" type="datetimeFigureOut">
               <a:rPr lang="en-US" smtClean="0"/>
               <a:pPr/>
-              <a:t>3/17/2012</a:t>
+              <a:t>3/17/12</a:t>
             </a:fld>
             <a:endParaRPr lang="en-US"/>
           </a:p>
@@ -4121,7 +4126,7 @@
             <a:fld id="{B399811B-96E0-4CFB-A18D-5C08E7CDD9A9}" type="slidenum">
               <a:rPr lang="en-US" smtClean="0"/>
               <a:pPr/>
-              <a:t>‹Nº›</a:t>
+              <a:t>‹#›</a:t>
             </a:fld>
             <a:endParaRPr lang="en-US"/>
           </a:p>
@@ -4130,7 +4135,7 @@
     </p:spTree>
     <p:extLst>
       <p:ext uri="{BB962C8B-B14F-4D97-AF65-F5344CB8AC3E}">
-        <p14:creationId xmlns="" xmlns:p14="http://schemas.microsoft.com/office/powerpoint/2010/main" val="2212676689"/>
+        <p14:creationId xmlns:p14="http://schemas.microsoft.com/office/powerpoint/2010/main" val="2212676689"/>
       </p:ext>
     </p:extLst>
   </p:cSld>
@@ -4333,7 +4338,7 @@
             <a:fld id="{8FCE8BCB-785D-411B-A74C-42F0947B65C9}" type="datetimeFigureOut">
               <a:rPr lang="en-US" smtClean="0"/>
               <a:pPr/>
-              <a:t>3/17/2012</a:t>
+              <a:t>3/17/12</a:t>
             </a:fld>
             <a:endParaRPr lang="en-US"/>
           </a:p>
@@ -4376,7 +4381,7 @@
             <a:fld id="{B399811B-96E0-4CFB-A18D-5C08E7CDD9A9}" type="slidenum">
               <a:rPr lang="en-US" smtClean="0"/>
               <a:pPr/>
-              <a:t>‹Nº›</a:t>
+              <a:t>‹#›</a:t>
             </a:fld>
             <a:endParaRPr lang="en-US"/>
           </a:p>
@@ -4385,7 +4390,7 @@
     </p:spTree>
     <p:extLst>
       <p:ext uri="{BB962C8B-B14F-4D97-AF65-F5344CB8AC3E}">
-        <p14:creationId xmlns="" xmlns:p14="http://schemas.microsoft.com/office/powerpoint/2010/main" val="4062114231"/>
+        <p14:creationId xmlns:p14="http://schemas.microsoft.com/office/powerpoint/2010/main" val="4062114231"/>
       </p:ext>
     </p:extLst>
   </p:cSld>
@@ -4548,7 +4553,7 @@
             <a:fld id="{8FCE8BCB-785D-411B-A74C-42F0947B65C9}" type="datetimeFigureOut">
               <a:rPr lang="en-US" smtClean="0"/>
               <a:pPr/>
-              <a:t>3/17/2012</a:t>
+              <a:t>3/17/12</a:t>
             </a:fld>
             <a:endParaRPr lang="en-US"/>
           </a:p>
@@ -4627,7 +4632,7 @@
             <a:fld id="{B399811B-96E0-4CFB-A18D-5C08E7CDD9A9}" type="slidenum">
               <a:rPr lang="en-US" smtClean="0"/>
               <a:pPr/>
-              <a:t>‹Nº›</a:t>
+              <a:t>‹#›</a:t>
             </a:fld>
             <a:endParaRPr lang="en-US"/>
           </a:p>
@@ -4636,7 +4641,7 @@
     </p:spTree>
     <p:extLst>
       <p:ext uri="{BB962C8B-B14F-4D97-AF65-F5344CB8AC3E}">
-        <p14:creationId xmlns="" xmlns:p14="http://schemas.microsoft.com/office/powerpoint/2010/main" val="2290327233"/>
+        <p14:creationId xmlns:p14="http://schemas.microsoft.com/office/powerpoint/2010/main" val="2290327233"/>
       </p:ext>
     </p:extLst>
   </p:cSld>
@@ -4948,11 +4953,7 @@
           <a:p>
             <a:r>
               <a:rPr lang="en-US" sz="3600" dirty="0" smtClean="0"/>
-              <a:t>[Project 1] </a:t>
-            </a:r>
-            <a:r>
-              <a:rPr lang="en-US" sz="3600" dirty="0" smtClean="0"/>
-              <a:t>Real-Time Strategy Games</a:t>
+              <a:t>[Project 1] Real-Time Strategy Games</a:t>
             </a:r>
             <a:endParaRPr lang="en-US" sz="3600" dirty="0"/>
           </a:p>
@@ -5139,7 +5140,7 @@
     </p:spTree>
     <p:extLst>
       <p:ext uri="{BB962C8B-B14F-4D97-AF65-F5344CB8AC3E}">
-        <p14:creationId xmlns="" xmlns:p14="http://schemas.microsoft.com/office/powerpoint/2010/main" val="850291249"/>
+        <p14:creationId xmlns:p14="http://schemas.microsoft.com/office/powerpoint/2010/main" val="850291249"/>
       </p:ext>
     </p:extLst>
   </p:cSld>
@@ -5149,7 +5150,7 @@
   <p:timing>
     <p:tnLst>
       <p:par>
-        <p:cTn id="1" dur="indefinite" restart="never" nodeType="tmRoot"/>
+        <p:cTn xmlns:p14="http://schemas.microsoft.com/office/powerpoint/2010/main" id="1" dur="indefinite" restart="never" nodeType="tmRoot"/>
       </p:par>
     </p:tnLst>
   </p:timing>
@@ -5290,7 +5291,7 @@
           <a:blip r:embed="rId2" cstate="print">
             <a:extLst>
               <a:ext uri="{28A0092B-C50C-407E-A947-70E740481C1C}">
-                <a14:useLocalDpi xmlns="" xmlns:a14="http://schemas.microsoft.com/office/drawing/2010/main" val="0"/>
+                <a14:useLocalDpi xmlns:a14="http://schemas.microsoft.com/office/drawing/2010/main" val="0"/>
               </a:ext>
             </a:extLst>
           </a:blip>
@@ -5309,8 +5310,8 @@
           </a:prstGeom>
           <a:noFill/>
           <a:extLst>
-            <a:ext uri="{909E8E84-426E-40DD-AFC4-6F175D3DCCD1}">
-              <a14:hiddenFill xmlns="" xmlns:a14="http://schemas.microsoft.com/office/drawing/2010/main">
+            <a:ext uri="{909E8E84-426E-40dd-AFC4-6F175D3DCCD1}">
+              <a14:hiddenFill xmlns:a14="http://schemas.microsoft.com/office/drawing/2010/main">
                 <a:solidFill>
                   <a:srgbClr val="FFFFFF"/>
                 </a:solidFill>
@@ -5383,7 +5384,7 @@
     </p:spTree>
     <p:extLst>
       <p:ext uri="{BB962C8B-B14F-4D97-AF65-F5344CB8AC3E}">
-        <p14:creationId xmlns="" xmlns:p14="http://schemas.microsoft.com/office/powerpoint/2010/main" val="2751761894"/>
+        <p14:creationId xmlns:p14="http://schemas.microsoft.com/office/powerpoint/2010/main" val="2751761894"/>
       </p:ext>
     </p:extLst>
   </p:cSld>
@@ -5393,7 +5394,7 @@
   <p:timing>
     <p:tnLst>
       <p:par>
-        <p:cTn id="1" dur="indefinite" restart="never" nodeType="tmRoot"/>
+        <p:cTn xmlns:p14="http://schemas.microsoft.com/office/powerpoint/2010/main" id="1" dur="indefinite" restart="never" nodeType="tmRoot"/>
       </p:par>
     </p:tnLst>
   </p:timing>
@@ -6489,7 +6490,7 @@
     </p:spTree>
     <p:extLst>
       <p:ext uri="{BB962C8B-B14F-4D97-AF65-F5344CB8AC3E}">
-        <p14:creationId xmlns="" xmlns:p14="http://schemas.microsoft.com/office/powerpoint/2010/main" val="1624131093"/>
+        <p14:creationId xmlns:p14="http://schemas.microsoft.com/office/powerpoint/2010/main" val="1624131093"/>
       </p:ext>
     </p:extLst>
   </p:cSld>
@@ -6499,7 +6500,7 @@
   <p:timing>
     <p:tnLst>
       <p:par>
-        <p:cTn id="1" dur="indefinite" restart="never" nodeType="tmRoot"/>
+        <p:cTn xmlns:p14="http://schemas.microsoft.com/office/powerpoint/2010/main" id="1" dur="indefinite" restart="never" nodeType="tmRoot"/>
       </p:par>
     </p:tnLst>
   </p:timing>
@@ -7761,7 +7762,7 @@
     </p:spTree>
     <p:extLst>
       <p:ext uri="{BB962C8B-B14F-4D97-AF65-F5344CB8AC3E}">
-        <p14:creationId xmlns="" xmlns:p14="http://schemas.microsoft.com/office/powerpoint/2010/main" val="4010505269"/>
+        <p14:creationId xmlns:p14="http://schemas.microsoft.com/office/powerpoint/2010/main" val="4010505269"/>
       </p:ext>
     </p:extLst>
   </p:cSld>
@@ -7771,7 +7772,7 @@
   <p:timing>
     <p:tnLst>
       <p:par>
-        <p:cTn id="1" dur="indefinite" restart="never" nodeType="tmRoot"/>
+        <p:cTn xmlns:p14="http://schemas.microsoft.com/office/powerpoint/2010/main" id="1" dur="indefinite" restart="never" nodeType="tmRoot"/>
       </p:par>
     </p:tnLst>
   </p:timing>
@@ -7882,7 +7883,7 @@
           <a:blip r:embed="rId2" cstate="print">
             <a:extLst>
               <a:ext uri="{28A0092B-C50C-407E-A947-70E740481C1C}">
-                <a14:useLocalDpi xmlns="" xmlns:a14="http://schemas.microsoft.com/office/drawing/2010/main" val="0"/>
+                <a14:useLocalDpi xmlns:a14="http://schemas.microsoft.com/office/drawing/2010/main" val="0"/>
               </a:ext>
             </a:extLst>
           </a:blip>
@@ -7901,8 +7902,8 @@
           </a:prstGeom>
           <a:noFill/>
           <a:extLst>
-            <a:ext uri="{909E8E84-426E-40DD-AFC4-6F175D3DCCD1}">
-              <a14:hiddenFill xmlns="" xmlns:a14="http://schemas.microsoft.com/office/drawing/2010/main">
+            <a:ext uri="{909E8E84-426E-40dd-AFC4-6F175D3DCCD1}">
+              <a14:hiddenFill xmlns:a14="http://schemas.microsoft.com/office/drawing/2010/main">
                 <a:solidFill>
                   <a:srgbClr val="FFFFFF"/>
                 </a:solidFill>
@@ -7975,7 +7976,7 @@
     </p:spTree>
     <p:extLst>
       <p:ext uri="{BB962C8B-B14F-4D97-AF65-F5344CB8AC3E}">
-        <p14:creationId xmlns="" xmlns:p14="http://schemas.microsoft.com/office/powerpoint/2010/main" val="1756666574"/>
+        <p14:creationId xmlns:p14="http://schemas.microsoft.com/office/powerpoint/2010/main" val="1756666574"/>
       </p:ext>
     </p:extLst>
   </p:cSld>
@@ -7985,7 +7986,7 @@
   <p:timing>
     <p:tnLst>
       <p:par>
-        <p:cTn id="1" dur="indefinite" restart="never" nodeType="tmRoot"/>
+        <p:cTn xmlns:p14="http://schemas.microsoft.com/office/powerpoint/2010/main" id="1" dur="indefinite" restart="never" nodeType="tmRoot"/>
       </p:par>
     </p:tnLst>
   </p:timing>
@@ -9108,15 +9109,7 @@
                   <a:sysClr val="windowText" lastClr="000000"/>
                 </a:solidFill>
               </a:rPr>
-              <a:t>Track </a:t>
-            </a:r>
-            <a:r>
-              <a:rPr lang="en-US" dirty="0" smtClean="0">
-                <a:solidFill>
-                  <a:sysClr val="windowText" lastClr="000000"/>
-                </a:solidFill>
-              </a:rPr>
-              <a:t>army composition</a:t>
+              <a:t>Track army composition</a:t>
             </a:r>
           </a:p>
           <a:p>
@@ -9199,7 +9192,7 @@
     </p:spTree>
     <p:extLst>
       <p:ext uri="{BB962C8B-B14F-4D97-AF65-F5344CB8AC3E}">
-        <p14:creationId xmlns="" xmlns:p14="http://schemas.microsoft.com/office/powerpoint/2010/main" val="1714157389"/>
+        <p14:creationId xmlns:p14="http://schemas.microsoft.com/office/powerpoint/2010/main" val="1714157389"/>
       </p:ext>
     </p:extLst>
   </p:cSld>
@@ -9209,7 +9202,7 @@
   <p:timing>
     <p:tnLst>
       <p:par>
-        <p:cTn id="1" dur="indefinite" restart="never" nodeType="tmRoot"/>
+        <p:cTn xmlns:p14="http://schemas.microsoft.com/office/powerpoint/2010/main" id="1" dur="indefinite" restart="never" nodeType="tmRoot"/>
       </p:par>
     </p:tnLst>
   </p:timing>
@@ -10342,7 +10335,7 @@
     </p:spTree>
     <p:extLst>
       <p:ext uri="{BB962C8B-B14F-4D97-AF65-F5344CB8AC3E}">
-        <p14:creationId xmlns="" xmlns:p14="http://schemas.microsoft.com/office/powerpoint/2010/main" val="2878125564"/>
+        <p14:creationId xmlns:p14="http://schemas.microsoft.com/office/powerpoint/2010/main" val="2878125564"/>
       </p:ext>
     </p:extLst>
   </p:cSld>
@@ -10352,7 +10345,7 @@
   <p:timing>
     <p:tnLst>
       <p:par>
-        <p:cTn id="1" dur="indefinite" restart="never" nodeType="tmRoot"/>
+        <p:cTn xmlns:p14="http://schemas.microsoft.com/office/powerpoint/2010/main" id="1" dur="indefinite" restart="never" nodeType="tmRoot"/>
       </p:par>
     </p:tnLst>
   </p:timing>
@@ -11610,7 +11603,7 @@
     </p:spTree>
     <p:extLst>
       <p:ext uri="{BB962C8B-B14F-4D97-AF65-F5344CB8AC3E}">
-        <p14:creationId xmlns="" xmlns:p14="http://schemas.microsoft.com/office/powerpoint/2010/main" val="799494674"/>
+        <p14:creationId xmlns:p14="http://schemas.microsoft.com/office/powerpoint/2010/main" val="799494674"/>
       </p:ext>
     </p:extLst>
   </p:cSld>
@@ -11620,7 +11613,7 @@
   <p:timing>
     <p:tnLst>
       <p:par>
-        <p:cTn id="1" dur="indefinite" restart="never" nodeType="tmRoot"/>
+        <p:cTn xmlns:p14="http://schemas.microsoft.com/office/powerpoint/2010/main" id="1" dur="indefinite" restart="never" nodeType="tmRoot"/>
       </p:par>
     </p:tnLst>
   </p:timing>
@@ -12878,7 +12871,7 @@
     </p:spTree>
     <p:extLst>
       <p:ext uri="{BB962C8B-B14F-4D97-AF65-F5344CB8AC3E}">
-        <p14:creationId xmlns="" xmlns:p14="http://schemas.microsoft.com/office/powerpoint/2010/main" val="3612248193"/>
+        <p14:creationId xmlns:p14="http://schemas.microsoft.com/office/powerpoint/2010/main" val="3612248193"/>
       </p:ext>
     </p:extLst>
   </p:cSld>
@@ -12888,7 +12881,7 @@
   <p:timing>
     <p:tnLst>
       <p:par>
-        <p:cTn id="1" dur="indefinite" restart="never" nodeType="tmRoot"/>
+        <p:cTn xmlns:p14="http://schemas.microsoft.com/office/powerpoint/2010/main" id="1" dur="indefinite" restart="never" nodeType="tmRoot"/>
       </p:par>
     </p:tnLst>
   </p:timing>
@@ -14446,7 +14439,7 @@
     </p:spTree>
     <p:extLst>
       <p:ext uri="{BB962C8B-B14F-4D97-AF65-F5344CB8AC3E}">
-        <p14:creationId xmlns="" xmlns:p14="http://schemas.microsoft.com/office/powerpoint/2010/main" val="464508250"/>
+        <p14:creationId xmlns:p14="http://schemas.microsoft.com/office/powerpoint/2010/main" val="464508250"/>
       </p:ext>
     </p:extLst>
   </p:cSld>
@@ -14456,7 +14449,7 @@
   <p:timing>
     <p:tnLst>
       <p:par>
-        <p:cTn id="1" dur="indefinite" restart="never" nodeType="tmRoot"/>
+        <p:cTn xmlns:p14="http://schemas.microsoft.com/office/powerpoint/2010/main" id="1" dur="indefinite" restart="never" nodeType="tmRoot"/>
       </p:par>
     </p:tnLst>
   </p:timing>
@@ -14522,7 +14515,7 @@
           <a:blip r:embed="rId2" cstate="print">
             <a:extLst>
               <a:ext uri="{28A0092B-C50C-407E-A947-70E740481C1C}">
-                <a14:useLocalDpi xmlns="" xmlns:a14="http://schemas.microsoft.com/office/drawing/2010/main" val="0"/>
+                <a14:useLocalDpi xmlns:a14="http://schemas.microsoft.com/office/drawing/2010/main" val="0"/>
               </a:ext>
             </a:extLst>
           </a:blip>
@@ -14541,8 +14534,8 @@
           </a:prstGeom>
           <a:noFill/>
           <a:extLst>
-            <a:ext uri="{909E8E84-426E-40DD-AFC4-6F175D3DCCD1}">
-              <a14:hiddenFill xmlns="" xmlns:a14="http://schemas.microsoft.com/office/drawing/2010/main">
+            <a:ext uri="{909E8E84-426E-40dd-AFC4-6F175D3DCCD1}">
+              <a14:hiddenFill xmlns:a14="http://schemas.microsoft.com/office/drawing/2010/main">
                 <a:solidFill>
                   <a:srgbClr val="FFFFFF"/>
                 </a:solidFill>
@@ -14942,7 +14935,7 @@
     </p:spTree>
     <p:extLst>
       <p:ext uri="{BB962C8B-B14F-4D97-AF65-F5344CB8AC3E}">
-        <p14:creationId xmlns="" xmlns:p14="http://schemas.microsoft.com/office/powerpoint/2010/main" val="79323105"/>
+        <p14:creationId xmlns:p14="http://schemas.microsoft.com/office/powerpoint/2010/main" val="79323105"/>
       </p:ext>
     </p:extLst>
   </p:cSld>
@@ -14952,7 +14945,7 @@
   <p:timing>
     <p:tnLst>
       <p:par>
-        <p:cTn id="1" dur="indefinite" restart="never" nodeType="tmRoot"/>
+        <p:cTn xmlns:p14="http://schemas.microsoft.com/office/powerpoint/2010/main" id="1" dur="indefinite" restart="never" nodeType="tmRoot"/>
       </p:par>
     </p:tnLst>
   </p:timing>
@@ -16130,7 +16123,7 @@
     </p:spTree>
     <p:extLst>
       <p:ext uri="{BB962C8B-B14F-4D97-AF65-F5344CB8AC3E}">
-        <p14:creationId xmlns="" xmlns:p14="http://schemas.microsoft.com/office/powerpoint/2010/main" val="850291249"/>
+        <p14:creationId xmlns:p14="http://schemas.microsoft.com/office/powerpoint/2010/main" val="850291249"/>
       </p:ext>
     </p:extLst>
   </p:cSld>
@@ -16140,7 +16133,7 @@
   <p:timing>
     <p:tnLst>
       <p:par>
-        <p:cTn id="1" dur="indefinite" restart="never" nodeType="tmRoot"/>
+        <p:cTn xmlns:p14="http://schemas.microsoft.com/office/powerpoint/2010/main" id="1" dur="indefinite" restart="never" nodeType="tmRoot"/>
       </p:par>
     </p:tnLst>
   </p:timing>
@@ -17478,7 +17471,7 @@
     </p:spTree>
     <p:extLst>
       <p:ext uri="{BB962C8B-B14F-4D97-AF65-F5344CB8AC3E}">
-        <p14:creationId xmlns="" xmlns:p14="http://schemas.microsoft.com/office/powerpoint/2010/main" val="1962791709"/>
+        <p14:creationId xmlns:p14="http://schemas.microsoft.com/office/powerpoint/2010/main" val="1962791709"/>
       </p:ext>
     </p:extLst>
   </p:cSld>
@@ -17488,7 +17481,7 @@
   <p:timing>
     <p:tnLst>
       <p:par>
-        <p:cTn id="1" dur="indefinite" restart="never" nodeType="tmRoot"/>
+        <p:cTn xmlns:p14="http://schemas.microsoft.com/office/powerpoint/2010/main" id="1" dur="indefinite" restart="never" nodeType="tmRoot"/>
       </p:par>
     </p:tnLst>
   </p:timing>
@@ -17974,7 +17967,7 @@
     </p:spTree>
     <p:extLst>
       <p:ext uri="{BB962C8B-B14F-4D97-AF65-F5344CB8AC3E}">
-        <p14:creationId xmlns="" xmlns:p14="http://schemas.microsoft.com/office/powerpoint/2010/main" val="527884918"/>
+        <p14:creationId xmlns:p14="http://schemas.microsoft.com/office/powerpoint/2010/main" val="527884918"/>
       </p:ext>
     </p:extLst>
   </p:cSld>
@@ -17984,7 +17977,7 @@
   <p:timing>
     <p:tnLst>
       <p:par>
-        <p:cTn id="1" dur="indefinite" restart="never" nodeType="tmRoot">
+        <p:cTn xmlns:p14="http://schemas.microsoft.com/office/powerpoint/2010/main" id="1" dur="indefinite" restart="never" nodeType="tmRoot">
           <p:childTnLst>
             <p:seq concurrent="1" nextAc="seek">
               <p:cTn id="2" dur="indefinite" nodeType="mainSeq">
@@ -18798,7 +18791,7 @@
     </p:spTree>
     <p:extLst>
       <p:ext uri="{BB962C8B-B14F-4D97-AF65-F5344CB8AC3E}">
-        <p14:creationId xmlns="" xmlns:p14="http://schemas.microsoft.com/office/powerpoint/2010/main" val="527884918"/>
+        <p14:creationId xmlns:p14="http://schemas.microsoft.com/office/powerpoint/2010/main" val="527884918"/>
       </p:ext>
     </p:extLst>
   </p:cSld>
@@ -18808,7 +18801,7 @@
   <p:timing>
     <p:tnLst>
       <p:par>
-        <p:cTn id="1" dur="indefinite" restart="never" nodeType="tmRoot"/>
+        <p:cTn xmlns:p14="http://schemas.microsoft.com/office/powerpoint/2010/main" id="1" dur="indefinite" restart="never" nodeType="tmRoot"/>
       </p:par>
     </p:tnLst>
   </p:timing>
@@ -20348,7 +20341,7 @@
     </p:spTree>
     <p:extLst>
       <p:ext uri="{BB962C8B-B14F-4D97-AF65-F5344CB8AC3E}">
-        <p14:creationId xmlns="" xmlns:p14="http://schemas.microsoft.com/office/powerpoint/2010/main" val="527884918"/>
+        <p14:creationId xmlns:p14="http://schemas.microsoft.com/office/powerpoint/2010/main" val="527884918"/>
       </p:ext>
     </p:extLst>
   </p:cSld>
@@ -20358,7 +20351,7 @@
   <p:timing>
     <p:tnLst>
       <p:par>
-        <p:cTn id="1" dur="indefinite" restart="never" nodeType="tmRoot">
+        <p:cTn xmlns:p14="http://schemas.microsoft.com/office/powerpoint/2010/main" id="1" dur="indefinite" restart="never" nodeType="tmRoot">
           <p:childTnLst>
             <p:seq concurrent="1" nextAc="seek">
               <p:cTn id="2" dur="indefinite" nodeType="mainSeq">
@@ -21035,7 +21028,7 @@
     </p:spTree>
     <p:extLst>
       <p:ext uri="{BB962C8B-B14F-4D97-AF65-F5344CB8AC3E}">
-        <p14:creationId xmlns="" xmlns:p14="http://schemas.microsoft.com/office/powerpoint/2010/main" val="527884918"/>
+        <p14:creationId xmlns:p14="http://schemas.microsoft.com/office/powerpoint/2010/main" val="527884918"/>
       </p:ext>
     </p:extLst>
   </p:cSld>
@@ -21045,7 +21038,7 @@
   <p:timing>
     <p:tnLst>
       <p:par>
-        <p:cTn id="1" dur="indefinite" restart="never" nodeType="tmRoot">
+        <p:cTn xmlns:p14="http://schemas.microsoft.com/office/powerpoint/2010/main" id="1" dur="indefinite" restart="never" nodeType="tmRoot">
           <p:childTnLst>
             <p:seq concurrent="1" nextAc="seek">
               <p:cTn id="2" dur="indefinite" nodeType="mainSeq">
@@ -21231,18 +21224,132 @@
           </a:p>
         </p:txBody>
       </p:sp>
+      <p:sp>
+        <p:nvSpPr>
+          <p:cNvPr id="7" name="32 Rectángulo"/>
+          <p:cNvSpPr/>
+          <p:nvPr/>
+        </p:nvSpPr>
+        <p:spPr>
+          <a:xfrm>
+            <a:off x="1143000" y="2667000"/>
+            <a:ext cx="7010400" cy="2133600"/>
+          </a:xfrm>
+          <a:prstGeom prst="rect">
+            <a:avLst/>
+          </a:prstGeom>
+          <a:solidFill>
+            <a:schemeClr val="accent2">
+              <a:lumMod val="40000"/>
+              <a:lumOff val="60000"/>
+            </a:schemeClr>
+          </a:solidFill>
+        </p:spPr>
+        <p:style>
+          <a:lnRef idx="2">
+            <a:schemeClr val="accent1">
+              <a:shade val="50000"/>
+            </a:schemeClr>
+          </a:lnRef>
+          <a:fillRef idx="1">
+            <a:schemeClr val="accent1"/>
+          </a:fillRef>
+          <a:effectRef idx="0">
+            <a:schemeClr val="accent1"/>
+          </a:effectRef>
+          <a:fontRef idx="minor">
+            <a:schemeClr val="lt1"/>
+          </a:fontRef>
+        </p:style>
+        <p:txBody>
+          <a:bodyPr rtlCol="0" anchor="t"/>
+          <a:lstStyle/>
+          <a:p>
+            <a:r>
+              <a:rPr lang="en-US" sz="3200" b="1" dirty="0" smtClean="0">
+                <a:solidFill>
+                  <a:sysClr val="windowText" lastClr="000000"/>
+                </a:solidFill>
+              </a:rPr>
+              <a:t>Goal:</a:t>
+            </a:r>
+          </a:p>
+          <a:p>
+            <a:r>
+              <a:rPr lang="en-US" sz="3200" dirty="0" smtClean="0">
+                <a:solidFill>
+                  <a:sysClr val="windowText" lastClr="000000"/>
+                </a:solidFill>
+              </a:rPr>
+              <a:t>Implement </a:t>
+            </a:r>
+            <a:r>
+              <a:rPr lang="en-US" sz="3200" dirty="0" smtClean="0">
+                <a:solidFill>
+                  <a:sysClr val="windowText" lastClr="000000"/>
+                </a:solidFill>
+              </a:rPr>
+              <a:t>hints to next objective in </a:t>
+            </a:r>
+            <a:r>
+              <a:rPr lang="en-US" sz="3200" i="1" dirty="0" err="1" smtClean="0">
+                <a:solidFill>
+                  <a:sysClr val="windowText" lastClr="000000"/>
+                </a:solidFill>
+              </a:rPr>
+              <a:t>Anchorhead</a:t>
+            </a:r>
+            <a:r>
+              <a:rPr lang="en-US" sz="3200" dirty="0" smtClean="0">
+                <a:solidFill>
+                  <a:sysClr val="windowText" lastClr="000000"/>
+                </a:solidFill>
+              </a:rPr>
+              <a:t> </a:t>
+            </a:r>
+            <a:r>
+              <a:rPr lang="en-US" sz="3200" dirty="0" smtClean="0">
+                <a:solidFill>
+                  <a:sysClr val="windowText" lastClr="000000"/>
+                </a:solidFill>
+              </a:rPr>
+              <a:t>to prevent players getting stuck</a:t>
+            </a:r>
+            <a:r>
+              <a:rPr lang="en-US" sz="3200" dirty="0" smtClean="0">
+                <a:solidFill>
+                  <a:sysClr val="windowText" lastClr="000000"/>
+                </a:solidFill>
+              </a:rPr>
+              <a:t>.</a:t>
+            </a:r>
+            <a:endParaRPr lang="en-US" sz="3200" dirty="0" smtClean="0">
+              <a:solidFill>
+                <a:sysClr val="windowText" lastClr="000000"/>
+              </a:solidFill>
+            </a:endParaRPr>
+          </a:p>
+          <a:p>
+            <a:endParaRPr lang="en-US" dirty="0">
+              <a:solidFill>
+                <a:sysClr val="windowText" lastClr="000000"/>
+              </a:solidFill>
+            </a:endParaRPr>
+          </a:p>
+        </p:txBody>
+      </p:sp>
     </p:spTree>
   </p:cSld>
   <p:clrMapOvr>
     <a:masterClrMapping/>
   </p:clrMapOvr>
-  <p:transition spd="slow">
+  <p:transition xmlns:p14="http://schemas.microsoft.com/office/powerpoint/2010/main" spd="slow">
     <p:cut/>
   </p:transition>
   <p:timing>
     <p:tnLst>
       <p:par>
-        <p:cTn id="1" dur="indefinite" restart="never" nodeType="tmRoot"/>
+        <p:cTn xmlns:p14="http://schemas.microsoft.com/office/powerpoint/2010/main" id="1" dur="indefinite" restart="never" nodeType="tmRoot"/>
       </p:par>
     </p:tnLst>
   </p:timing>
@@ -21429,13 +21536,13 @@
   <p:clrMapOvr>
     <a:masterClrMapping/>
   </p:clrMapOvr>
-  <p:transition spd="slow">
+  <p:transition xmlns:p14="http://schemas.microsoft.com/office/powerpoint/2010/main" spd="slow">
     <p:cut/>
   </p:transition>
   <p:timing>
     <p:tnLst>
       <p:par>
-        <p:cTn id="1" dur="indefinite" restart="never" nodeType="tmRoot"/>
+        <p:cTn xmlns:p14="http://schemas.microsoft.com/office/powerpoint/2010/main" id="1" dur="indefinite" restart="never" nodeType="tmRoot"/>
       </p:par>
     </p:tnLst>
   </p:timing>
@@ -21832,13 +21939,13 @@
   <p:clrMapOvr>
     <a:masterClrMapping/>
   </p:clrMapOvr>
-  <p:transition spd="slow">
+  <p:transition xmlns:p14="http://schemas.microsoft.com/office/powerpoint/2010/main" spd="slow">
     <p:cut/>
   </p:transition>
   <p:timing>
     <p:tnLst>
       <p:par>
-        <p:cTn id="1" dur="indefinite" restart="never" nodeType="tmRoot"/>
+        <p:cTn xmlns:p14="http://schemas.microsoft.com/office/powerpoint/2010/main" id="1" dur="indefinite" restart="never" nodeType="tmRoot"/>
       </p:par>
     </p:tnLst>
   </p:timing>
@@ -22130,13 +22237,13 @@
   <p:clrMapOvr>
     <a:masterClrMapping/>
   </p:clrMapOvr>
-  <p:transition spd="slow">
+  <p:transition xmlns:p14="http://schemas.microsoft.com/office/powerpoint/2010/main" spd="slow">
     <p:cut/>
   </p:transition>
   <p:timing>
     <p:tnLst>
       <p:par>
-        <p:cTn id="1" dur="indefinite" restart="never" nodeType="tmRoot"/>
+        <p:cTn xmlns:p14="http://schemas.microsoft.com/office/powerpoint/2010/main" id="1" dur="indefinite" restart="never" nodeType="tmRoot"/>
       </p:par>
     </p:tnLst>
   </p:timing>
@@ -22328,13 +22435,13 @@
   <p:clrMapOvr>
     <a:masterClrMapping/>
   </p:clrMapOvr>
-  <p:transition spd="slow">
+  <p:transition xmlns:p14="http://schemas.microsoft.com/office/powerpoint/2010/main" spd="slow">
     <p:cut/>
   </p:transition>
   <p:timing>
     <p:tnLst>
       <p:par>
-        <p:cTn id="1" dur="indefinite" restart="never" nodeType="tmRoot"/>
+        <p:cTn xmlns:p14="http://schemas.microsoft.com/office/powerpoint/2010/main" id="1" dur="indefinite" restart="never" nodeType="tmRoot"/>
       </p:par>
     </p:tnLst>
   </p:timing>
@@ -23510,7 +23617,7 @@
     </p:spTree>
     <p:extLst>
       <p:ext uri="{BB962C8B-B14F-4D97-AF65-F5344CB8AC3E}">
-        <p14:creationId xmlns="" xmlns:p14="http://schemas.microsoft.com/office/powerpoint/2010/main" val="240745927"/>
+        <p14:creationId xmlns:p14="http://schemas.microsoft.com/office/powerpoint/2010/main" val="240745927"/>
       </p:ext>
     </p:extLst>
   </p:cSld>
@@ -23520,7 +23627,7 @@
   <p:timing>
     <p:tnLst>
       <p:par>
-        <p:cTn id="1" dur="indefinite" restart="never" nodeType="tmRoot"/>
+        <p:cTn xmlns:p14="http://schemas.microsoft.com/office/powerpoint/2010/main" id="1" dur="indefinite" restart="never" nodeType="tmRoot"/>
       </p:par>
     </p:tnLst>
   </p:timing>
@@ -23725,13 +23832,13 @@
   <p:clrMapOvr>
     <a:masterClrMapping/>
   </p:clrMapOvr>
-  <p:transition spd="slow">
+  <p:transition xmlns:p14="http://schemas.microsoft.com/office/powerpoint/2010/main" spd="slow">
     <p:cut/>
   </p:transition>
   <p:timing>
     <p:tnLst>
       <p:par>
-        <p:cTn id="1" dur="indefinite" restart="never" nodeType="tmRoot"/>
+        <p:cTn xmlns:p14="http://schemas.microsoft.com/office/powerpoint/2010/main" id="1" dur="indefinite" restart="never" nodeType="tmRoot"/>
       </p:par>
     </p:tnLst>
   </p:timing>
@@ -23937,13 +24044,13 @@
   <p:clrMapOvr>
     <a:masterClrMapping/>
   </p:clrMapOvr>
-  <p:transition spd="slow">
+  <p:transition xmlns:p14="http://schemas.microsoft.com/office/powerpoint/2010/main" spd="slow">
     <p:cut/>
   </p:transition>
   <p:timing>
     <p:tnLst>
       <p:par>
-        <p:cTn id="1" dur="indefinite" restart="never" nodeType="tmRoot"/>
+        <p:cTn xmlns:p14="http://schemas.microsoft.com/office/powerpoint/2010/main" id="1" dur="indefinite" restart="never" nodeType="tmRoot"/>
       </p:par>
     </p:tnLst>
   </p:timing>
@@ -24183,13 +24290,13 @@
   <p:clrMapOvr>
     <a:masterClrMapping/>
   </p:clrMapOvr>
-  <p:transition spd="slow">
+  <p:transition xmlns:p14="http://schemas.microsoft.com/office/powerpoint/2010/main" spd="slow">
     <p:cut/>
   </p:transition>
   <p:timing>
     <p:tnLst>
       <p:par>
-        <p:cTn id="1" dur="indefinite" restart="never" nodeType="tmRoot"/>
+        <p:cTn xmlns:p14="http://schemas.microsoft.com/office/powerpoint/2010/main" id="1" dur="indefinite" restart="never" nodeType="tmRoot"/>
       </p:par>
     </p:tnLst>
   </p:timing>
@@ -24358,23 +24465,7 @@
           <a:p>
             <a:r>
               <a:rPr lang="en-US" dirty="0" smtClean="0"/>
-              <a:t>3 – Assign randomly the elevation of each region. But we have to ensure the existence of a path between the </a:t>
-            </a:r>
-            <a:r>
-              <a:rPr lang="en-US" dirty="0" smtClean="0"/>
-              <a:t>right-bottom </a:t>
-            </a:r>
-            <a:r>
-              <a:rPr lang="en-US" dirty="0" smtClean="0"/>
-              <a:t>region to the </a:t>
-            </a:r>
-            <a:r>
-              <a:rPr lang="en-US" dirty="0" smtClean="0"/>
-              <a:t>left-top </a:t>
-            </a:r>
-            <a:r>
-              <a:rPr lang="en-US" dirty="0" smtClean="0"/>
-              <a:t>region.</a:t>
+              <a:t>3 – Assign randomly the elevation of each region. But we have to ensure the existence of a path between the right-bottom region to the left-top region.</a:t>
             </a:r>
             <a:endParaRPr lang="en-US" dirty="0"/>
           </a:p>
@@ -24411,13 +24502,13 @@
   <p:clrMapOvr>
     <a:masterClrMapping/>
   </p:clrMapOvr>
-  <p:transition spd="slow">
+  <p:transition xmlns:p14="http://schemas.microsoft.com/office/powerpoint/2010/main" spd="slow">
     <p:cut/>
   </p:transition>
   <p:timing>
     <p:tnLst>
       <p:par>
-        <p:cTn id="1" dur="indefinite" restart="never" nodeType="tmRoot"/>
+        <p:cTn xmlns:p14="http://schemas.microsoft.com/office/powerpoint/2010/main" id="1" dur="indefinite" restart="never" nodeType="tmRoot"/>
       </p:par>
     </p:tnLst>
   </p:timing>
@@ -24623,13 +24714,13 @@
   <p:clrMapOvr>
     <a:masterClrMapping/>
   </p:clrMapOvr>
-  <p:transition spd="slow">
+  <p:transition xmlns:p14="http://schemas.microsoft.com/office/powerpoint/2010/main" spd="slow">
     <p:cut/>
   </p:transition>
   <p:timing>
     <p:tnLst>
       <p:par>
-        <p:cTn id="1" dur="indefinite" restart="never" nodeType="tmRoot"/>
+        <p:cTn xmlns:p14="http://schemas.microsoft.com/office/powerpoint/2010/main" id="1" dur="indefinite" restart="never" nodeType="tmRoot"/>
       </p:par>
     </p:tnLst>
   </p:timing>
@@ -24798,11 +24889,7 @@
           <a:p>
             <a:r>
               <a:rPr lang="en-US" dirty="0" smtClean="0"/>
-              <a:t>4 – </a:t>
-            </a:r>
-            <a:r>
-              <a:rPr lang="en-US" dirty="0" smtClean="0"/>
-              <a:t>Convert our abstract map into </a:t>
+              <a:t>4 – Convert our abstract map into </a:t>
             </a:r>
             <a:r>
               <a:rPr lang="en-US" dirty="0" err="1" smtClean="0"/>
@@ -24912,13 +24999,13 @@
   <p:clrMapOvr>
     <a:masterClrMapping/>
   </p:clrMapOvr>
-  <p:transition spd="slow">
+  <p:transition xmlns:p14="http://schemas.microsoft.com/office/powerpoint/2010/main" spd="slow">
     <p:cut/>
   </p:transition>
   <p:timing>
     <p:tnLst>
       <p:par>
-        <p:cTn id="1" dur="indefinite" restart="never" nodeType="tmRoot"/>
+        <p:cTn xmlns:p14="http://schemas.microsoft.com/office/powerpoint/2010/main" id="1" dur="indefinite" restart="never" nodeType="tmRoot"/>
       </p:par>
     </p:tnLst>
   </p:timing>
@@ -25192,13 +25279,13 @@
   <p:clrMapOvr>
     <a:masterClrMapping/>
   </p:clrMapOvr>
-  <p:transition spd="slow">
+  <p:transition xmlns:p14="http://schemas.microsoft.com/office/powerpoint/2010/main" spd="slow">
     <p:cut/>
   </p:transition>
   <p:timing>
     <p:tnLst>
       <p:par>
-        <p:cTn id="1" dur="indefinite" restart="never" nodeType="tmRoot"/>
+        <p:cTn xmlns:p14="http://schemas.microsoft.com/office/powerpoint/2010/main" id="1" dur="indefinite" restart="never" nodeType="tmRoot"/>
       </p:par>
     </p:tnLst>
   </p:timing>
@@ -25455,13 +25542,13 @@
   <p:clrMapOvr>
     <a:masterClrMapping/>
   </p:clrMapOvr>
-  <p:transition spd="slow">
+  <p:transition xmlns:p14="http://schemas.microsoft.com/office/powerpoint/2010/main" spd="slow">
     <p:cut/>
   </p:transition>
   <p:timing>
     <p:tnLst>
       <p:par>
-        <p:cTn id="1" dur="indefinite" restart="never" nodeType="tmRoot"/>
+        <p:cTn xmlns:p14="http://schemas.microsoft.com/office/powerpoint/2010/main" id="1" dur="indefinite" restart="never" nodeType="tmRoot"/>
       </p:par>
     </p:tnLst>
   </p:timing>
@@ -26522,7 +26609,7 @@
     </p:spTree>
     <p:extLst>
       <p:ext uri="{BB962C8B-B14F-4D97-AF65-F5344CB8AC3E}">
-        <p14:creationId xmlns="" xmlns:p14="http://schemas.microsoft.com/office/powerpoint/2010/main" val="991279201"/>
+        <p14:creationId xmlns:p14="http://schemas.microsoft.com/office/powerpoint/2010/main" val="991279201"/>
       </p:ext>
     </p:extLst>
   </p:cSld>
@@ -26532,7 +26619,7 @@
   <p:timing>
     <p:tnLst>
       <p:par>
-        <p:cTn id="1" dur="indefinite" restart="never" nodeType="tmRoot"/>
+        <p:cTn xmlns:p14="http://schemas.microsoft.com/office/powerpoint/2010/main" id="1" dur="indefinite" restart="never" nodeType="tmRoot"/>
       </p:par>
     </p:tnLst>
   </p:timing>
@@ -26652,11 +26739,7 @@
             </a:r>
             <a:r>
               <a:rPr lang="en-US" dirty="0" smtClean="0"/>
-              <a:t> </a:t>
-            </a:r>
-            <a:r>
-              <a:rPr lang="en-US" dirty="0" smtClean="0"/>
-              <a:t>Diagrams to detect Regions and </a:t>
+              <a:t> Diagrams to detect Regions and </a:t>
             </a:r>
             <a:r>
               <a:rPr lang="en-US" dirty="0" err="1" smtClean="0"/>
@@ -26733,7 +26816,7 @@
     </p:spTree>
     <p:extLst>
       <p:ext uri="{BB962C8B-B14F-4D97-AF65-F5344CB8AC3E}">
-        <p14:creationId xmlns="" xmlns:p14="http://schemas.microsoft.com/office/powerpoint/2010/main" val="1062390099"/>
+        <p14:creationId xmlns:p14="http://schemas.microsoft.com/office/powerpoint/2010/main" val="1062390099"/>
       </p:ext>
     </p:extLst>
   </p:cSld>
@@ -26743,7 +26826,7 @@
   <p:timing>
     <p:tnLst>
       <p:par>
-        <p:cTn id="1" dur="indefinite" restart="never" nodeType="tmRoot"/>
+        <p:cTn xmlns:p14="http://schemas.microsoft.com/office/powerpoint/2010/main" id="1" dur="indefinite" restart="never" nodeType="tmRoot"/>
       </p:par>
     </p:tnLst>
   </p:timing>
@@ -26829,15 +26912,7 @@
             <a:pPr algn="ctr"/>
             <a:r>
               <a:rPr lang="en-US" dirty="0" smtClean="0"/>
-              <a:t>Our threat map is a matrix of the map where every cell is the DPS (Damage Per Second) </a:t>
-            </a:r>
-            <a:r>
-              <a:rPr lang="en-US" dirty="0" smtClean="0"/>
-              <a:t>that our </a:t>
-            </a:r>
-            <a:r>
-              <a:rPr lang="en-US" dirty="0" smtClean="0"/>
-              <a:t>opponent can do.</a:t>
+              <a:t>Our threat map is a matrix of the map where every cell is the DPS (Damage Per Second) that our opponent can do.</a:t>
             </a:r>
             <a:endParaRPr lang="en-US" dirty="0"/>
           </a:p>
@@ -26855,7 +26930,7 @@
           <a:blip r:embed="rId2" cstate="print">
             <a:extLst>
               <a:ext uri="{28A0092B-C50C-407E-A947-70E740481C1C}">
-                <a14:useLocalDpi xmlns="" xmlns:a14="http://schemas.microsoft.com/office/drawing/2010/main" val="0"/>
+                <a14:useLocalDpi xmlns:a14="http://schemas.microsoft.com/office/drawing/2010/main" val="0"/>
               </a:ext>
             </a:extLst>
           </a:blip>
@@ -26874,8 +26949,8 @@
           </a:prstGeom>
           <a:noFill/>
           <a:extLst>
-            <a:ext uri="{909E8E84-426E-40DD-AFC4-6F175D3DCCD1}">
-              <a14:hiddenFill xmlns="" xmlns:a14="http://schemas.microsoft.com/office/drawing/2010/main">
+            <a:ext uri="{909E8E84-426E-40dd-AFC4-6F175D3DCCD1}">
+              <a14:hiddenFill xmlns:a14="http://schemas.microsoft.com/office/drawing/2010/main">
                 <a:solidFill>
                   <a:srgbClr val="FFFFFF"/>
                 </a:solidFill>
@@ -26948,7 +27023,7 @@
     </p:spTree>
     <p:extLst>
       <p:ext uri="{BB962C8B-B14F-4D97-AF65-F5344CB8AC3E}">
-        <p14:creationId xmlns="" xmlns:p14="http://schemas.microsoft.com/office/powerpoint/2010/main" val="2007822478"/>
+        <p14:creationId xmlns:p14="http://schemas.microsoft.com/office/powerpoint/2010/main" val="2007822478"/>
       </p:ext>
     </p:extLst>
   </p:cSld>
@@ -26958,7 +27033,7 @@
   <p:timing>
     <p:tnLst>
       <p:par>
-        <p:cTn id="1" dur="indefinite" restart="never" nodeType="tmRoot"/>
+        <p:cTn xmlns:p14="http://schemas.microsoft.com/office/powerpoint/2010/main" id="1" dur="indefinite" restart="never" nodeType="tmRoot"/>
       </p:par>
     </p:tnLst>
   </p:timing>
@@ -27070,7 +27145,7 @@
           <a:blip r:embed="rId2" cstate="print">
             <a:extLst>
               <a:ext uri="{28A0092B-C50C-407E-A947-70E740481C1C}">
-                <a14:useLocalDpi xmlns="" xmlns:a14="http://schemas.microsoft.com/office/drawing/2010/main" val="0"/>
+                <a14:useLocalDpi xmlns:a14="http://schemas.microsoft.com/office/drawing/2010/main" val="0"/>
               </a:ext>
             </a:extLst>
           </a:blip>
@@ -27089,8 +27164,8 @@
           </a:prstGeom>
           <a:noFill/>
           <a:extLst>
-            <a:ext uri="{909E8E84-426E-40DD-AFC4-6F175D3DCCD1}">
-              <a14:hiddenFill xmlns="" xmlns:a14="http://schemas.microsoft.com/office/drawing/2010/main">
+            <a:ext uri="{909E8E84-426E-40dd-AFC4-6F175D3DCCD1}">
+              <a14:hiddenFill xmlns:a14="http://schemas.microsoft.com/office/drawing/2010/main">
                 <a:solidFill>
                   <a:srgbClr val="FFFFFF"/>
                 </a:solidFill>
@@ -27163,7 +27238,7 @@
     </p:spTree>
     <p:extLst>
       <p:ext uri="{BB962C8B-B14F-4D97-AF65-F5344CB8AC3E}">
-        <p14:creationId xmlns="" xmlns:p14="http://schemas.microsoft.com/office/powerpoint/2010/main" val="2687416414"/>
+        <p14:creationId xmlns:p14="http://schemas.microsoft.com/office/powerpoint/2010/main" val="2687416414"/>
       </p:ext>
     </p:extLst>
   </p:cSld>
@@ -27173,7 +27248,7 @@
   <p:timing>
     <p:tnLst>
       <p:par>
-        <p:cTn id="1" dur="indefinite" restart="never" nodeType="tmRoot"/>
+        <p:cTn xmlns:p14="http://schemas.microsoft.com/office/powerpoint/2010/main" id="1" dur="indefinite" restart="never" nodeType="tmRoot"/>
       </p:par>
     </p:tnLst>
   </p:timing>
@@ -28109,7 +28184,7 @@
     </p:spTree>
     <p:extLst>
       <p:ext uri="{BB962C8B-B14F-4D97-AF65-F5344CB8AC3E}">
-        <p14:creationId xmlns="" xmlns:p14="http://schemas.microsoft.com/office/powerpoint/2010/main" val="743235833"/>
+        <p14:creationId xmlns:p14="http://schemas.microsoft.com/office/powerpoint/2010/main" val="743235833"/>
       </p:ext>
     </p:extLst>
   </p:cSld>
@@ -28119,7 +28194,7 @@
   <p:timing>
     <p:tnLst>
       <p:par>
-        <p:cTn id="1" dur="indefinite" restart="never" nodeType="tmRoot"/>
+        <p:cTn xmlns:p14="http://schemas.microsoft.com/office/powerpoint/2010/main" id="1" dur="indefinite" restart="never" nodeType="tmRoot"/>
       </p:par>
     </p:tnLst>
   </p:timing>
@@ -29215,7 +29290,7 @@
     </p:spTree>
     <p:extLst>
       <p:ext uri="{BB962C8B-B14F-4D97-AF65-F5344CB8AC3E}">
-        <p14:creationId xmlns="" xmlns:p14="http://schemas.microsoft.com/office/powerpoint/2010/main" val="2677880483"/>
+        <p14:creationId xmlns:p14="http://schemas.microsoft.com/office/powerpoint/2010/main" val="2677880483"/>
       </p:ext>
     </p:extLst>
   </p:cSld>
@@ -29225,7 +29300,7 @@
   <p:timing>
     <p:tnLst>
       <p:par>
-        <p:cTn id="1" dur="indefinite" restart="never" nodeType="tmRoot"/>
+        <p:cTn xmlns:p14="http://schemas.microsoft.com/office/powerpoint/2010/main" id="1" dur="indefinite" restart="never" nodeType="tmRoot"/>
       </p:par>
     </p:tnLst>
   </p:timing>

</xml_diff>